<commit_message>
new file added in to snowflake
</commit_message>
<xml_diff>
--- a/Snowflake/PPT/23.UserDefinedFunctions.pptx
+++ b/Snowflake/PPT/23.UserDefinedFunctions.pptx
@@ -265,7 +265,7 @@
           <a:p>
             <a:fld id="{AB2FF845-C8D2-4283-9432-B9F609B9952E}" type="datetimeFigureOut">
               <a:rPr lang="en-IN" smtClean="0"/>
-              <a:t>08-12-2022</a:t>
+              <a:t>24-01-2024</a:t>
             </a:fld>
             <a:endParaRPr lang="en-IN"/>
           </a:p>
@@ -465,7 +465,7 @@
           <a:p>
             <a:fld id="{AB2FF845-C8D2-4283-9432-B9F609B9952E}" type="datetimeFigureOut">
               <a:rPr lang="en-IN" smtClean="0"/>
-              <a:t>08-12-2022</a:t>
+              <a:t>24-01-2024</a:t>
             </a:fld>
             <a:endParaRPr lang="en-IN"/>
           </a:p>
@@ -675,7 +675,7 @@
           <a:p>
             <a:fld id="{AB2FF845-C8D2-4283-9432-B9F609B9952E}" type="datetimeFigureOut">
               <a:rPr lang="en-IN" smtClean="0"/>
-              <a:t>08-12-2022</a:t>
+              <a:t>24-01-2024</a:t>
             </a:fld>
             <a:endParaRPr lang="en-IN"/>
           </a:p>
@@ -875,7 +875,7 @@
           <a:p>
             <a:fld id="{AB2FF845-C8D2-4283-9432-B9F609B9952E}" type="datetimeFigureOut">
               <a:rPr lang="en-IN" smtClean="0"/>
-              <a:t>08-12-2022</a:t>
+              <a:t>24-01-2024</a:t>
             </a:fld>
             <a:endParaRPr lang="en-IN"/>
           </a:p>
@@ -1151,7 +1151,7 @@
           <a:p>
             <a:fld id="{AB2FF845-C8D2-4283-9432-B9F609B9952E}" type="datetimeFigureOut">
               <a:rPr lang="en-IN" smtClean="0"/>
-              <a:t>08-12-2022</a:t>
+              <a:t>24-01-2024</a:t>
             </a:fld>
             <a:endParaRPr lang="en-IN"/>
           </a:p>
@@ -1419,7 +1419,7 @@
           <a:p>
             <a:fld id="{AB2FF845-C8D2-4283-9432-B9F609B9952E}" type="datetimeFigureOut">
               <a:rPr lang="en-IN" smtClean="0"/>
-              <a:t>08-12-2022</a:t>
+              <a:t>24-01-2024</a:t>
             </a:fld>
             <a:endParaRPr lang="en-IN"/>
           </a:p>
@@ -1834,7 +1834,7 @@
           <a:p>
             <a:fld id="{AB2FF845-C8D2-4283-9432-B9F609B9952E}" type="datetimeFigureOut">
               <a:rPr lang="en-IN" smtClean="0"/>
-              <a:t>08-12-2022</a:t>
+              <a:t>24-01-2024</a:t>
             </a:fld>
             <a:endParaRPr lang="en-IN"/>
           </a:p>
@@ -1976,7 +1976,7 @@
           <a:p>
             <a:fld id="{AB2FF845-C8D2-4283-9432-B9F609B9952E}" type="datetimeFigureOut">
               <a:rPr lang="en-IN" smtClean="0"/>
-              <a:t>08-12-2022</a:t>
+              <a:t>24-01-2024</a:t>
             </a:fld>
             <a:endParaRPr lang="en-IN"/>
           </a:p>
@@ -2089,7 +2089,7 @@
           <a:p>
             <a:fld id="{AB2FF845-C8D2-4283-9432-B9F609B9952E}" type="datetimeFigureOut">
               <a:rPr lang="en-IN" smtClean="0"/>
-              <a:t>08-12-2022</a:t>
+              <a:t>24-01-2024</a:t>
             </a:fld>
             <a:endParaRPr lang="en-IN"/>
           </a:p>
@@ -2402,7 +2402,7 @@
           <a:p>
             <a:fld id="{AB2FF845-C8D2-4283-9432-B9F609B9952E}" type="datetimeFigureOut">
               <a:rPr lang="en-IN" smtClean="0"/>
-              <a:t>08-12-2022</a:t>
+              <a:t>24-01-2024</a:t>
             </a:fld>
             <a:endParaRPr lang="en-IN"/>
           </a:p>
@@ -2691,7 +2691,7 @@
           <a:p>
             <a:fld id="{AB2FF845-C8D2-4283-9432-B9F609B9952E}" type="datetimeFigureOut">
               <a:rPr lang="en-IN" smtClean="0"/>
-              <a:t>08-12-2022</a:t>
+              <a:t>24-01-2024</a:t>
             </a:fld>
             <a:endParaRPr lang="en-IN"/>
           </a:p>
@@ -2934,7 +2934,7 @@
           <a:p>
             <a:fld id="{AB2FF845-C8D2-4283-9432-B9F609B9952E}" type="datetimeFigureOut">
               <a:rPr lang="en-IN" smtClean="0"/>
-              <a:t>08-12-2022</a:t>
+              <a:t>24-01-2024</a:t>
             </a:fld>
             <a:endParaRPr lang="en-IN"/>
           </a:p>
@@ -3692,7 +3692,7 @@
         </p:spPr>
         <p:txBody>
           <a:bodyPr>
-            <a:normAutofit lnSpcReduction="10000"/>
+            <a:normAutofit fontScale="92500" lnSpcReduction="10000"/>
           </a:bodyPr>
           <a:lstStyle/>
           <a:p>
@@ -3795,7 +3795,7 @@
                 </a:solidFill>
                 <a:latin typeface="Arial" panose="020B0604020202020204" pitchFamily="34" charset="0"/>
               </a:rPr>
-              <a:t>Snowflake UDFs can return scalar(Just a value or a string) and tabular results.</a:t>
+              <a:t>Snowflake UDFs can return scalar(Just a value or a string) and tabular results.(we can create tabular form not performable in UDF for that we are mainly using Stored Procedures)</a:t>
             </a:r>
           </a:p>
           <a:p>

</xml_diff>